<commit_message>
added rotation vector to euler transformation, and other small typos
</commit_message>
<xml_diff>
--- a/textbook/chap2_preliminaries/figures/figures.pptx
+++ b/textbook/chap2_preliminaries/figures/figures.pptx
@@ -4544,7 +4544,7 @@
             <a:camera prst="legacyObliqueBottomLeft"/>
             <a:lightRig rig="legacyFlat3" dir="t"/>
           </a:scene3d>
-          <a:sp3d extrusionH="100000" prstMaterial="legacyWireframe">
+          <a:sp3d extrusionH="196850" prstMaterial="legacyWireframe">
             <a:bevelT w="13500" h="13500" prst="angle"/>
             <a:bevelB w="13500" h="13500" prst="angle"/>
             <a:extrusionClr>
@@ -4561,7 +4561,7 @@
           </a:bodyPr>
           <a:lstStyle/>
           <a:p>
-            <a:endParaRPr lang="en-US"/>
+            <a:endParaRPr lang="en-US" dirty="0"/>
           </a:p>
         </p:txBody>
       </p:sp>
@@ -4575,8 +4575,8 @@
         </p:nvSpPr>
         <p:spPr bwMode="auto">
           <a:xfrm flipV="1">
-            <a:off x="3943350" y="2903538"/>
-            <a:ext cx="1189038" cy="1119187"/>
+            <a:off x="3943350" y="2957195"/>
+            <a:ext cx="1144375" cy="1065529"/>
           </a:xfrm>
           <a:prstGeom prst="line">
             <a:avLst/>
@@ -4614,8 +4614,8 @@
         </p:nvSpPr>
         <p:spPr bwMode="auto">
           <a:xfrm flipV="1">
-            <a:off x="5189538" y="2160588"/>
-            <a:ext cx="731837" cy="685800"/>
+            <a:off x="5221075" y="2160588"/>
+            <a:ext cx="700300" cy="668196"/>
           </a:xfrm>
           <a:prstGeom prst="line">
             <a:avLst/>
@@ -4653,8 +4653,8 @@
         </p:nvSpPr>
         <p:spPr bwMode="auto">
           <a:xfrm flipV="1">
-            <a:off x="3941763" y="1931988"/>
-            <a:ext cx="715962" cy="2089150"/>
+            <a:off x="3941764" y="2089608"/>
+            <a:ext cx="675736" cy="1931530"/>
           </a:xfrm>
           <a:prstGeom prst="line">
             <a:avLst/>
@@ -4677,7 +4677,7 @@
           </a:bodyPr>
           <a:lstStyle/>
           <a:p>
-            <a:endParaRPr lang="en-US"/>
+            <a:endParaRPr lang="en-US" dirty="0"/>
           </a:p>
         </p:txBody>
       </p:sp>
@@ -4691,8 +4691,8 @@
         </p:nvSpPr>
         <p:spPr bwMode="auto">
           <a:xfrm flipV="1">
-            <a:off x="4695825" y="1123950"/>
-            <a:ext cx="244475" cy="698500"/>
+            <a:off x="4715014" y="1129994"/>
+            <a:ext cx="228073" cy="694514"/>
           </a:xfrm>
           <a:prstGeom prst="line">
             <a:avLst/>
@@ -4985,8 +4985,8 @@
         </p:nvSpPr>
         <p:spPr bwMode="auto">
           <a:xfrm flipV="1">
-            <a:off x="3948113" y="2643188"/>
-            <a:ext cx="976312" cy="1366837"/>
+            <a:off x="3948113" y="2708001"/>
+            <a:ext cx="936702" cy="1302023"/>
           </a:xfrm>
           <a:prstGeom prst="line">
             <a:avLst/>
@@ -5062,8 +5062,8 @@
         </p:nvSpPr>
         <p:spPr bwMode="auto">
           <a:xfrm flipV="1">
-            <a:off x="4976813" y="1804988"/>
-            <a:ext cx="561975" cy="771525"/>
+            <a:off x="5000086" y="1804987"/>
+            <a:ext cx="538702" cy="752037"/>
           </a:xfrm>
           <a:prstGeom prst="line">
             <a:avLst/>

</xml_diff>